<commit_message>
added bootstrap to assets
</commit_message>
<xml_diff>
--- a/presentations/ASE_ppt01.pptx
+++ b/presentations/ASE_ppt01.pptx
@@ -6,10 +6,10 @@
     <p:sldMasterId id="2147483688" r:id="rId2"/>
   </p:sldMasterIdLst>
   <p:notesMasterIdLst>
-    <p:notesMasterId r:id="rId17"/>
+    <p:notesMasterId r:id="rId15"/>
   </p:notesMasterIdLst>
   <p:handoutMasterIdLst>
-    <p:handoutMasterId r:id="rId18"/>
+    <p:handoutMasterId r:id="rId16"/>
   </p:handoutMasterIdLst>
   <p:sldIdLst>
     <p:sldId id="256" r:id="rId3"/>
@@ -20,12 +20,10 @@
     <p:sldId id="276" r:id="rId8"/>
     <p:sldId id="274" r:id="rId9"/>
     <p:sldId id="278" r:id="rId10"/>
-    <p:sldId id="279" r:id="rId11"/>
-    <p:sldId id="280" r:id="rId12"/>
-    <p:sldId id="271" r:id="rId13"/>
-    <p:sldId id="281" r:id="rId14"/>
-    <p:sldId id="272" r:id="rId15"/>
-    <p:sldId id="273" r:id="rId16"/>
+    <p:sldId id="271" r:id="rId11"/>
+    <p:sldId id="281" r:id="rId12"/>
+    <p:sldId id="272" r:id="rId13"/>
+    <p:sldId id="273" r:id="rId14"/>
   </p:sldIdLst>
   <p:sldSz cx="9144000" cy="6858000" type="screen4x3"/>
   <p:notesSz cx="7099300" cy="10234613"/>
@@ -192,8 +190,6 @@
             <p14:sldId id="276"/>
             <p14:sldId id="274"/>
             <p14:sldId id="278"/>
-            <p14:sldId id="279"/>
-            <p14:sldId id="280"/>
             <p14:sldId id="271"/>
             <p14:sldId id="281"/>
             <p14:sldId id="272"/>
@@ -1442,7 +1438,7 @@
     </p:spTree>
     <p:extLst>
       <p:ext uri="{BB962C8B-B14F-4D97-AF65-F5344CB8AC3E}">
-        <p14:creationId xmlns:p14="http://schemas.microsoft.com/office/powerpoint/2010/main" val="1394180301"/>
+        <p14:creationId xmlns:p14="http://schemas.microsoft.com/office/powerpoint/2010/main" val="1932439475"/>
       </p:ext>
     </p:extLst>
   </p:cSld>
@@ -1532,7 +1528,7 @@
     </p:spTree>
     <p:extLst>
       <p:ext uri="{BB962C8B-B14F-4D97-AF65-F5344CB8AC3E}">
-        <p14:creationId xmlns:p14="http://schemas.microsoft.com/office/powerpoint/2010/main" val="785819554"/>
+        <p14:creationId xmlns:p14="http://schemas.microsoft.com/office/powerpoint/2010/main" val="470640716"/>
       </p:ext>
     </p:extLst>
   </p:cSld>
@@ -1614,186 +1610,6 @@
                 <a:defRPr/>
               </a:pPr>
               <a:t>12</a:t>
-            </a:fld>
-            <a:endParaRPr lang="de-CH"/>
-          </a:p>
-        </p:txBody>
-      </p:sp>
-    </p:spTree>
-    <p:extLst>
-      <p:ext uri="{BB962C8B-B14F-4D97-AF65-F5344CB8AC3E}">
-        <p14:creationId xmlns:p14="http://schemas.microsoft.com/office/powerpoint/2010/main" val="1932439475"/>
-      </p:ext>
-    </p:extLst>
-  </p:cSld>
-  <p:clrMapOvr>
-    <a:masterClrMapping/>
-  </p:clrMapOvr>
-</p:notes>
-</file>
-
-<file path=ppt/notesSlides/notesSlide13.xml><?xml version="1.0" encoding="utf-8"?>
-<p:notes xmlns:a="http://schemas.openxmlformats.org/drawingml/2006/main" xmlns:r="http://schemas.openxmlformats.org/officeDocument/2006/relationships" xmlns:p="http://schemas.openxmlformats.org/presentationml/2006/main">
-  <p:cSld>
-    <p:spTree>
-      <p:nvGrpSpPr>
-        <p:cNvPr id="1" name=""/>
-        <p:cNvGrpSpPr/>
-        <p:nvPr/>
-      </p:nvGrpSpPr>
-      <p:grpSpPr>
-        <a:xfrm>
-          <a:off x="0" y="0"/>
-          <a:ext cx="0" cy="0"/>
-          <a:chOff x="0" y="0"/>
-          <a:chExt cx="0" cy="0"/>
-        </a:xfrm>
-      </p:grpSpPr>
-      <p:sp>
-        <p:nvSpPr>
-          <p:cNvPr id="2" name="Folienbildplatzhalter 1"/>
-          <p:cNvSpPr>
-            <a:spLocks noGrp="1" noRot="1" noChangeAspect="1"/>
-          </p:cNvSpPr>
-          <p:nvPr>
-            <p:ph type="sldImg"/>
-          </p:nvPr>
-        </p:nvSpPr>
-        <p:spPr/>
-      </p:sp>
-      <p:sp>
-        <p:nvSpPr>
-          <p:cNvPr id="3" name="Notizenplatzhalter 2"/>
-          <p:cNvSpPr>
-            <a:spLocks noGrp="1"/>
-          </p:cNvSpPr>
-          <p:nvPr>
-            <p:ph type="body" idx="1"/>
-          </p:nvPr>
-        </p:nvSpPr>
-        <p:spPr/>
-        <p:txBody>
-          <a:bodyPr/>
-          <a:lstStyle/>
-          <a:p>
-            <a:endParaRPr lang="de-DE"/>
-          </a:p>
-        </p:txBody>
-      </p:sp>
-      <p:sp>
-        <p:nvSpPr>
-          <p:cNvPr id="4" name="Foliennummernplatzhalter 3"/>
-          <p:cNvSpPr>
-            <a:spLocks noGrp="1"/>
-          </p:cNvSpPr>
-          <p:nvPr>
-            <p:ph type="sldNum" idx="10"/>
-          </p:nvPr>
-        </p:nvSpPr>
-        <p:spPr/>
-        <p:txBody>
-          <a:bodyPr/>
-          <a:lstStyle/>
-          <a:p>
-            <a:pPr>
-              <a:defRPr/>
-            </a:pPr>
-            <a:fld id="{C16D0CD2-25C7-4008-A681-E8352BFD7136}" type="slidenum">
-              <a:rPr lang="de-CH"/>
-              <a:pPr>
-                <a:defRPr/>
-              </a:pPr>
-              <a:t>13</a:t>
-            </a:fld>
-            <a:endParaRPr lang="de-CH"/>
-          </a:p>
-        </p:txBody>
-      </p:sp>
-    </p:spTree>
-    <p:extLst>
-      <p:ext uri="{BB962C8B-B14F-4D97-AF65-F5344CB8AC3E}">
-        <p14:creationId xmlns:p14="http://schemas.microsoft.com/office/powerpoint/2010/main" val="470640716"/>
-      </p:ext>
-    </p:extLst>
-  </p:cSld>
-  <p:clrMapOvr>
-    <a:masterClrMapping/>
-  </p:clrMapOvr>
-</p:notes>
-</file>
-
-<file path=ppt/notesSlides/notesSlide14.xml><?xml version="1.0" encoding="utf-8"?>
-<p:notes xmlns:a="http://schemas.openxmlformats.org/drawingml/2006/main" xmlns:r="http://schemas.openxmlformats.org/officeDocument/2006/relationships" xmlns:p="http://schemas.openxmlformats.org/presentationml/2006/main">
-  <p:cSld>
-    <p:spTree>
-      <p:nvGrpSpPr>
-        <p:cNvPr id="1" name=""/>
-        <p:cNvGrpSpPr/>
-        <p:nvPr/>
-      </p:nvGrpSpPr>
-      <p:grpSpPr>
-        <a:xfrm>
-          <a:off x="0" y="0"/>
-          <a:ext cx="0" cy="0"/>
-          <a:chOff x="0" y="0"/>
-          <a:chExt cx="0" cy="0"/>
-        </a:xfrm>
-      </p:grpSpPr>
-      <p:sp>
-        <p:nvSpPr>
-          <p:cNvPr id="2" name="Folienbildplatzhalter 1"/>
-          <p:cNvSpPr>
-            <a:spLocks noGrp="1" noRot="1" noChangeAspect="1"/>
-          </p:cNvSpPr>
-          <p:nvPr>
-            <p:ph type="sldImg"/>
-          </p:nvPr>
-        </p:nvSpPr>
-        <p:spPr/>
-      </p:sp>
-      <p:sp>
-        <p:nvSpPr>
-          <p:cNvPr id="3" name="Notizenplatzhalter 2"/>
-          <p:cNvSpPr>
-            <a:spLocks noGrp="1"/>
-          </p:cNvSpPr>
-          <p:nvPr>
-            <p:ph type="body" idx="1"/>
-          </p:nvPr>
-        </p:nvSpPr>
-        <p:spPr/>
-        <p:txBody>
-          <a:bodyPr/>
-          <a:lstStyle/>
-          <a:p>
-            <a:endParaRPr lang="de-DE"/>
-          </a:p>
-        </p:txBody>
-      </p:sp>
-      <p:sp>
-        <p:nvSpPr>
-          <p:cNvPr id="4" name="Foliennummernplatzhalter 3"/>
-          <p:cNvSpPr>
-            <a:spLocks noGrp="1"/>
-          </p:cNvSpPr>
-          <p:nvPr>
-            <p:ph type="sldNum" idx="10"/>
-          </p:nvPr>
-        </p:nvSpPr>
-        <p:spPr/>
-        <p:txBody>
-          <a:bodyPr/>
-          <a:lstStyle/>
-          <a:p>
-            <a:pPr>
-              <a:defRPr/>
-            </a:pPr>
-            <a:fld id="{C16D0CD2-25C7-4008-A681-E8352BFD7136}" type="slidenum">
-              <a:rPr lang="de-CH"/>
-              <a:pPr>
-                <a:defRPr/>
-              </a:pPr>
-              <a:t>14</a:t>
             </a:fld>
             <a:endParaRPr lang="de-CH"/>
           </a:p>
@@ -2522,7 +2338,7 @@
     </p:spTree>
     <p:extLst>
       <p:ext uri="{BB962C8B-B14F-4D97-AF65-F5344CB8AC3E}">
-        <p14:creationId xmlns:p14="http://schemas.microsoft.com/office/powerpoint/2010/main" val="4167120718"/>
+        <p14:creationId xmlns:p14="http://schemas.microsoft.com/office/powerpoint/2010/main" val="785819554"/>
       </p:ext>
     </p:extLst>
   </p:cSld>
@@ -11242,19 +11058,14 @@
             <p:ph type="title"/>
           </p:nvPr>
         </p:nvSpPr>
-        <p:spPr>
-          <a:xfrm>
-            <a:off x="491060" y="790575"/>
-            <a:ext cx="6618288" cy="814388"/>
-          </a:xfrm>
-        </p:spPr>
+        <p:spPr/>
         <p:txBody>
           <a:bodyPr/>
           <a:lstStyle/>
           <a:p>
             <a:r>
               <a:rPr lang="de-DE"/>
-              <a:t>Project Idea</a:t>
+              <a:t>Team Organisation</a:t>
             </a:r>
             <a:endParaRPr lang="de-DE" dirty="0"/>
           </a:p>
@@ -11275,85 +11086,83 @@
           <a:bodyPr/>
           <a:lstStyle/>
           <a:p>
+            <a:r>
+              <a:rPr lang="de-DE"/>
+              <a:t>Scrum Master</a:t>
+            </a:r>
+            <a:endParaRPr lang="de-DE" dirty="0"/>
+          </a:p>
+          <a:p>
             <a:pPr lvl="1"/>
-            <a:endParaRPr lang="de-DE" sz="1600" dirty="0">
-              <a:latin typeface="Arial" charset="0"/>
-            </a:endParaRPr>
-          </a:p>
-          <a:p>
-            <a:r>
-              <a:rPr lang="de-DE" dirty="0">
-                <a:latin typeface="Arial" charset="0"/>
-              </a:rPr>
-              <a:t>Build training teams </a:t>
-            </a:r>
-          </a:p>
-          <a:p>
-            <a:r>
-              <a:rPr lang="en-US" dirty="0">
-                <a:latin typeface="Arial" charset="0"/>
-              </a:rPr>
-              <a:t>Training sessions summary </a:t>
+            <a:r>
+              <a:rPr lang="de-DE" dirty="0"/>
+              <a:t>Lukas von Rotz</a:t>
+            </a:r>
+          </a:p>
+          <a:p>
+            <a:r>
+              <a:rPr lang="de-DE" dirty="0"/>
+              <a:t>Test Manager</a:t>
             </a:r>
           </a:p>
           <a:p>
             <a:pPr lvl="1"/>
             <a:r>
-              <a:rPr lang="en-US" sz="1600" dirty="0">
-                <a:latin typeface="Arial" charset="0"/>
-              </a:rPr>
-              <a:t>Most intense </a:t>
+              <a:rPr lang="de-DE" dirty="0"/>
+              <a:t>Pascal Zaugg</a:t>
+            </a:r>
+          </a:p>
+          <a:p>
+            <a:r>
+              <a:rPr lang="de-DE" sz="1800" dirty="0" err="1"/>
+              <a:t>Deployment</a:t>
+            </a:r>
+            <a:r>
+              <a:rPr lang="de-DE" sz="1800" dirty="0"/>
+              <a:t> Manager (</a:t>
+            </a:r>
+            <a:r>
+              <a:rPr lang="de-DE" sz="1800" dirty="0" err="1"/>
+              <a:t>Heroku</a:t>
+            </a:r>
+            <a:r>
+              <a:rPr lang="de-DE" sz="1800" dirty="0"/>
+              <a:t>)</a:t>
             </a:r>
           </a:p>
           <a:p>
             <a:pPr lvl="1"/>
             <a:r>
-              <a:rPr lang="en-US" sz="1600" dirty="0">
-                <a:latin typeface="Arial" charset="0"/>
-              </a:rPr>
-              <a:t>Partners</a:t>
-            </a:r>
+              <a:rPr lang="de-DE"/>
+              <a:t>Andreas Hohler</a:t>
+            </a:r>
+            <a:endParaRPr lang="de-DE" dirty="0"/>
+          </a:p>
+          <a:p>
+            <a:r>
+              <a:rPr lang="de-DE" sz="1800" dirty="0"/>
+              <a:t>UI </a:t>
+            </a:r>
+            <a:r>
+              <a:rPr lang="de-DE" sz="1800" dirty="0" err="1"/>
+              <a:t>Specialists</a:t>
+            </a:r>
+            <a:endParaRPr lang="de-DE" sz="1800" dirty="0"/>
           </a:p>
           <a:p>
             <a:pPr lvl="1"/>
             <a:r>
-              <a:rPr lang="en-US" sz="1600" dirty="0">
-                <a:latin typeface="Arial" charset="0"/>
-              </a:rPr>
-              <a:t>Longest Training</a:t>
+              <a:rPr lang="de-DE" dirty="0"/>
+              <a:t>Adrian Kurt</a:t>
             </a:r>
           </a:p>
           <a:p>
             <a:pPr lvl="1"/>
             <a:r>
-              <a:rPr lang="en-US" sz="1600" dirty="0">
-                <a:latin typeface="Arial" charset="0"/>
-              </a:rPr>
-              <a:t>Average time</a:t>
-            </a:r>
-          </a:p>
-          <a:p>
-            <a:pPr lvl="1"/>
-            <a:r>
-              <a:rPr lang="en-US" sz="1600" dirty="0">
-                <a:latin typeface="Arial" charset="0"/>
-              </a:rPr>
-              <a:t>Most fun</a:t>
-            </a:r>
-          </a:p>
-          <a:p>
-            <a:r>
-              <a:rPr lang="de-DE" dirty="0"/>
-              <a:t>Training proposals</a:t>
-            </a:r>
-          </a:p>
-          <a:p>
-            <a:pPr lvl="1"/>
-            <a:r>
-              <a:rPr lang="de-DE" sz="1600" dirty="0"/>
-              <a:t>Depending on location, preferences and attended training</a:t>
-            </a:r>
-            <a:endParaRPr lang="en-US" sz="1600" dirty="0"/>
+              <a:rPr lang="de-DE"/>
+              <a:t>Karan Sethi</a:t>
+            </a:r>
+            <a:endParaRPr lang="de-DE" dirty="0"/>
           </a:p>
         </p:txBody>
       </p:sp>
@@ -11386,7 +11195,7 @@
     </p:spTree>
     <p:extLst>
       <p:ext uri="{BB962C8B-B14F-4D97-AF65-F5344CB8AC3E}">
-        <p14:creationId xmlns:p14="http://schemas.microsoft.com/office/powerpoint/2010/main" val="3478395935"/>
+        <p14:creationId xmlns:p14="http://schemas.microsoft.com/office/powerpoint/2010/main" val="1846850943"/>
       </p:ext>
     </p:extLst>
   </p:cSld>
@@ -11436,89 +11245,139 @@
           <a:lstStyle/>
           <a:p>
             <a:r>
+              <a:rPr lang="de-CH" dirty="0" smtClean="0"/>
+              <a:t>Project Plan</a:t>
+            </a:r>
+            <a:endParaRPr lang="de-CH" dirty="0"/>
+          </a:p>
+        </p:txBody>
+      </p:sp>
+      <p:sp>
+        <p:nvSpPr>
+          <p:cNvPr id="3" name="Inhaltsplatzhalter 2"/>
+          <p:cNvSpPr>
+            <a:spLocks noGrp="1"/>
+          </p:cNvSpPr>
+          <p:nvPr>
+            <p:ph idx="1"/>
+          </p:nvPr>
+        </p:nvSpPr>
+        <p:spPr/>
+        <p:txBody>
+          <a:bodyPr/>
+          <a:lstStyle/>
+          <a:p>
+            <a:r>
+              <a:rPr lang="de-CH" dirty="0" err="1"/>
+              <a:t>Versioning</a:t>
+            </a:r>
+            <a:r>
               <a:rPr lang="de-CH" dirty="0"/>
-              <a:t>Services</a:t>
+              <a:t>: </a:t>
+            </a:r>
+            <a:r>
+              <a:rPr lang="de-CH" dirty="0" err="1"/>
+              <a:t>Git</a:t>
+            </a:r>
+            <a:r>
+              <a:rPr lang="de-CH" dirty="0"/>
+              <a:t> / </a:t>
+            </a:r>
+            <a:r>
+              <a:rPr lang="de-CH" dirty="0" err="1"/>
+              <a:t>GitHub</a:t>
             </a:r>
             <a:endParaRPr lang="de-DE" dirty="0"/>
           </a:p>
-        </p:txBody>
-      </p:sp>
-      <p:sp>
-        <p:nvSpPr>
-          <p:cNvPr id="3" name="Inhaltsplatzhalter 2"/>
-          <p:cNvSpPr>
-            <a:spLocks noGrp="1"/>
-          </p:cNvSpPr>
-          <p:nvPr>
-            <p:ph idx="1"/>
-          </p:nvPr>
-        </p:nvSpPr>
-        <p:spPr/>
-        <p:txBody>
-          <a:bodyPr/>
-          <a:lstStyle/>
           <a:p>
             <a:r>
               <a:rPr lang="de-CH" dirty="0"/>
-              <a:t>Facebook (</a:t>
-            </a:r>
-            <a:r>
-              <a:rPr lang="de-CH" dirty="0">
-                <a:latin typeface="Arial" charset="0"/>
-              </a:rPr>
-              <a:t>https://developers.facebook.com/)</a:t>
-            </a:r>
-            <a:endParaRPr lang="de-DE" dirty="0">
-              <a:latin typeface="Arial" charset="0"/>
-            </a:endParaRPr>
+              <a:t>Hosting: </a:t>
+            </a:r>
+            <a:r>
+              <a:rPr lang="de-CH" dirty="0" err="1"/>
+              <a:t>Heroku</a:t>
+            </a:r>
+            <a:endParaRPr lang="de-CH" dirty="0"/>
           </a:p>
           <a:p>
             <a:r>
               <a:rPr lang="de-CH" dirty="0"/>
-              <a:t>Twitter (</a:t>
-            </a:r>
-            <a:r>
-              <a:rPr lang="de-CH" dirty="0">
-                <a:latin typeface="Arial" charset="0"/>
-              </a:rPr>
-              <a:t>https://dev.twitter.com/)</a:t>
-            </a:r>
-          </a:p>
-          <a:p>
+              <a:t>Bug </a:t>
+            </a:r>
+            <a:r>
+              <a:rPr lang="de-CH" dirty="0" err="1"/>
+              <a:t>tracking</a:t>
+            </a:r>
             <a:r>
               <a:rPr lang="de-CH" dirty="0"/>
-              <a:t>Google </a:t>
+              <a:t>: </a:t>
             </a:r>
             <a:r>
               <a:rPr lang="de-CH" dirty="0" err="1"/>
-              <a:t>Maps (</a:t>
-            </a:r>
-            <a:r>
-              <a:rPr lang="de-CH" dirty="0">
-                <a:latin typeface="Arial" charset="0"/>
-              </a:rPr>
-              <a:t>https://developers.google.com/maps/documentation/javascript/)</a:t>
-            </a:r>
-          </a:p>
-          <a:p>
+              <a:t>GitHub</a:t>
+            </a:r>
+            <a:r>
+              <a:rPr lang="de-CH" dirty="0"/>
+              <a:t> </a:t>
+            </a:r>
             <a:r>
               <a:rPr lang="de-CH" dirty="0" err="1"/>
-              <a:t>Weather (https://openweathermap.org/api)</a:t>
+              <a:t>Issues</a:t>
             </a:r>
             <a:endParaRPr lang="de-CH" dirty="0"/>
           </a:p>
           <a:p>
             <a:r>
               <a:rPr lang="de-CH" dirty="0"/>
-              <a:t>SBB (http://transport.opendata.ch)</a:t>
-            </a:r>
-          </a:p>
-          <a:p>
-            <a:r>
-              <a:rPr lang="de-CH" dirty="0">
-                <a:latin typeface="Arial" charset="0"/>
-              </a:rPr>
-              <a:t>Gmail Account</a:t>
+              <a:t>Doc: </a:t>
+            </a:r>
+            <a:r>
+              <a:rPr lang="de-CH" dirty="0" err="1"/>
+              <a:t>GitHub</a:t>
+            </a:r>
+            <a:r>
+              <a:rPr lang="de-CH" dirty="0"/>
+              <a:t> Wiki</a:t>
+            </a:r>
+          </a:p>
+          <a:p>
+            <a:r>
+              <a:rPr lang="de-CH" dirty="0"/>
+              <a:t>Milestones / Tasks: </a:t>
+            </a:r>
+            <a:r>
+              <a:rPr lang="de-CH" dirty="0" err="1"/>
+              <a:t>Scrum</a:t>
+            </a:r>
+            <a:r>
+              <a:rPr lang="de-CH" dirty="0"/>
+              <a:t> </a:t>
+            </a:r>
+            <a:r>
+              <a:rPr lang="de-CH" dirty="0" err="1"/>
+              <a:t>excel</a:t>
+            </a:r>
+            <a:endParaRPr lang="de-CH" dirty="0"/>
+          </a:p>
+          <a:p>
+            <a:r>
+              <a:rPr lang="de-CH" dirty="0"/>
+              <a:t>Testing</a:t>
+            </a:r>
+          </a:p>
+          <a:p>
+            <a:pPr lvl="1"/>
+            <a:r>
+              <a:rPr lang="de-CH" sz="1600" dirty="0"/>
+              <a:t>Unit tests: RSpec</a:t>
+            </a:r>
+          </a:p>
+          <a:p>
+            <a:pPr lvl="1"/>
+            <a:r>
+              <a:rPr lang="de-CH" sz="1600" dirty="0"/>
+              <a:t>Acceptance tests: Selenium</a:t>
             </a:r>
           </a:p>
         </p:txBody>
@@ -11552,7 +11411,7 @@
     </p:spTree>
     <p:extLst>
       <p:ext uri="{BB962C8B-B14F-4D97-AF65-F5344CB8AC3E}">
-        <p14:creationId xmlns:p14="http://schemas.microsoft.com/office/powerpoint/2010/main" val="3242594773"/>
+        <p14:creationId xmlns:p14="http://schemas.microsoft.com/office/powerpoint/2010/main" val="3536873116"/>
       </p:ext>
     </p:extLst>
   </p:cSld>
@@ -11602,403 +11461,6 @@
           <a:lstStyle/>
           <a:p>
             <a:r>
-              <a:rPr lang="de-DE"/>
-              <a:t>Team Organisation</a:t>
-            </a:r>
-            <a:endParaRPr lang="de-DE" dirty="0"/>
-          </a:p>
-        </p:txBody>
-      </p:sp>
-      <p:sp>
-        <p:nvSpPr>
-          <p:cNvPr id="3" name="Inhaltsplatzhalter 2"/>
-          <p:cNvSpPr>
-            <a:spLocks noGrp="1"/>
-          </p:cNvSpPr>
-          <p:nvPr>
-            <p:ph idx="1"/>
-          </p:nvPr>
-        </p:nvSpPr>
-        <p:spPr/>
-        <p:txBody>
-          <a:bodyPr/>
-          <a:lstStyle/>
-          <a:p>
-            <a:r>
-              <a:rPr lang="de-DE"/>
-              <a:t>Scrum Master</a:t>
-            </a:r>
-            <a:endParaRPr lang="de-DE" dirty="0"/>
-          </a:p>
-          <a:p>
-            <a:pPr lvl="1"/>
-            <a:r>
-              <a:rPr lang="de-DE" dirty="0"/>
-              <a:t>Lukas von Rotz</a:t>
-            </a:r>
-          </a:p>
-          <a:p>
-            <a:r>
-              <a:rPr lang="de-DE" dirty="0"/>
-              <a:t>Test Manager</a:t>
-            </a:r>
-          </a:p>
-          <a:p>
-            <a:pPr lvl="1"/>
-            <a:r>
-              <a:rPr lang="de-DE" dirty="0"/>
-              <a:t>Pascal Zaugg</a:t>
-            </a:r>
-          </a:p>
-          <a:p>
-            <a:r>
-              <a:rPr lang="de-DE" sz="1800" dirty="0" err="1"/>
-              <a:t>Deployment</a:t>
-            </a:r>
-            <a:r>
-              <a:rPr lang="de-DE" sz="1800" dirty="0"/>
-              <a:t> Manager (</a:t>
-            </a:r>
-            <a:r>
-              <a:rPr lang="de-DE" sz="1800" dirty="0" err="1"/>
-              <a:t>Heroku</a:t>
-            </a:r>
-            <a:r>
-              <a:rPr lang="de-DE" sz="1800" dirty="0"/>
-              <a:t>)</a:t>
-            </a:r>
-          </a:p>
-          <a:p>
-            <a:pPr lvl="1"/>
-            <a:r>
-              <a:rPr lang="de-DE"/>
-              <a:t>Andreas Hohler</a:t>
-            </a:r>
-            <a:endParaRPr lang="de-DE" dirty="0"/>
-          </a:p>
-          <a:p>
-            <a:r>
-              <a:rPr lang="de-DE" sz="1800" dirty="0"/>
-              <a:t>UI </a:t>
-            </a:r>
-            <a:r>
-              <a:rPr lang="de-DE" sz="1800" dirty="0" err="1"/>
-              <a:t>Specialists</a:t>
-            </a:r>
-            <a:endParaRPr lang="de-DE" sz="1800" dirty="0"/>
-          </a:p>
-          <a:p>
-            <a:pPr lvl="1"/>
-            <a:r>
-              <a:rPr lang="de-DE" dirty="0"/>
-              <a:t>Adrian Kurt</a:t>
-            </a:r>
-          </a:p>
-          <a:p>
-            <a:pPr lvl="1"/>
-            <a:r>
-              <a:rPr lang="de-DE"/>
-              <a:t>Karan Sethi</a:t>
-            </a:r>
-            <a:endParaRPr lang="de-DE" dirty="0"/>
-          </a:p>
-        </p:txBody>
-      </p:sp>
-      <p:sp>
-        <p:nvSpPr>
-          <p:cNvPr id="4" name="Datumsplatzhalter 3"/>
-          <p:cNvSpPr>
-            <a:spLocks noGrp="1"/>
-          </p:cNvSpPr>
-          <p:nvPr>
-            <p:ph type="dt" idx="10"/>
-          </p:nvPr>
-        </p:nvSpPr>
-        <p:spPr/>
-        <p:txBody>
-          <a:bodyPr/>
-          <a:lstStyle/>
-          <a:p>
-            <a:pPr>
-              <a:defRPr/>
-            </a:pPr>
-            <a:r>
-              <a:rPr lang="de-DE" smtClean="0"/>
-              <a:t>06.10.2015</a:t>
-            </a:r>
-            <a:endParaRPr lang="de-DE"/>
-          </a:p>
-        </p:txBody>
-      </p:sp>
-    </p:spTree>
-    <p:extLst>
-      <p:ext uri="{BB962C8B-B14F-4D97-AF65-F5344CB8AC3E}">
-        <p14:creationId xmlns:p14="http://schemas.microsoft.com/office/powerpoint/2010/main" val="1846850943"/>
-      </p:ext>
-    </p:extLst>
-  </p:cSld>
-  <p:clrMapOvr>
-    <a:masterClrMapping/>
-  </p:clrMapOvr>
-  <p:timing>
-    <p:tnLst>
-      <p:par>
-        <p:cTn id="1" dur="indefinite" restart="never" nodeType="tmRoot"/>
-      </p:par>
-    </p:tnLst>
-  </p:timing>
-</p:sld>
-</file>
-
-<file path=ppt/slides/slide13.xml><?xml version="1.0" encoding="utf-8"?>
-<p:sld xmlns:a="http://schemas.openxmlformats.org/drawingml/2006/main" xmlns:r="http://schemas.openxmlformats.org/officeDocument/2006/relationships" xmlns:p="http://schemas.openxmlformats.org/presentationml/2006/main">
-  <p:cSld>
-    <p:spTree>
-      <p:nvGrpSpPr>
-        <p:cNvPr id="1" name=""/>
-        <p:cNvGrpSpPr/>
-        <p:nvPr/>
-      </p:nvGrpSpPr>
-      <p:grpSpPr>
-        <a:xfrm>
-          <a:off x="0" y="0"/>
-          <a:ext cx="0" cy="0"/>
-          <a:chOff x="0" y="0"/>
-          <a:chExt cx="0" cy="0"/>
-        </a:xfrm>
-      </p:grpSpPr>
-      <p:sp>
-        <p:nvSpPr>
-          <p:cNvPr id="2" name="Titel 1"/>
-          <p:cNvSpPr>
-            <a:spLocks noGrp="1"/>
-          </p:cNvSpPr>
-          <p:nvPr>
-            <p:ph type="title"/>
-          </p:nvPr>
-        </p:nvSpPr>
-        <p:spPr/>
-        <p:txBody>
-          <a:bodyPr/>
-          <a:lstStyle/>
-          <a:p>
-            <a:r>
-              <a:rPr lang="de-CH" dirty="0" smtClean="0"/>
-              <a:t>Project Plan</a:t>
-            </a:r>
-            <a:endParaRPr lang="de-CH" dirty="0"/>
-          </a:p>
-        </p:txBody>
-      </p:sp>
-      <p:sp>
-        <p:nvSpPr>
-          <p:cNvPr id="3" name="Inhaltsplatzhalter 2"/>
-          <p:cNvSpPr>
-            <a:spLocks noGrp="1"/>
-          </p:cNvSpPr>
-          <p:nvPr>
-            <p:ph idx="1"/>
-          </p:nvPr>
-        </p:nvSpPr>
-        <p:spPr/>
-        <p:txBody>
-          <a:bodyPr/>
-          <a:lstStyle/>
-          <a:p>
-            <a:r>
-              <a:rPr lang="de-CH" dirty="0" err="1"/>
-              <a:t>Versioning</a:t>
-            </a:r>
-            <a:r>
-              <a:rPr lang="de-CH" dirty="0"/>
-              <a:t>: </a:t>
-            </a:r>
-            <a:r>
-              <a:rPr lang="de-CH" dirty="0" err="1"/>
-              <a:t>Git</a:t>
-            </a:r>
-            <a:r>
-              <a:rPr lang="de-CH" dirty="0"/>
-              <a:t> / </a:t>
-            </a:r>
-            <a:r>
-              <a:rPr lang="de-CH" dirty="0" err="1"/>
-              <a:t>GitHub</a:t>
-            </a:r>
-            <a:endParaRPr lang="de-DE" dirty="0"/>
-          </a:p>
-          <a:p>
-            <a:r>
-              <a:rPr lang="de-CH" dirty="0"/>
-              <a:t>Hosting: </a:t>
-            </a:r>
-            <a:r>
-              <a:rPr lang="de-CH" dirty="0" err="1"/>
-              <a:t>Heroku</a:t>
-            </a:r>
-            <a:endParaRPr lang="de-CH" dirty="0"/>
-          </a:p>
-          <a:p>
-            <a:r>
-              <a:rPr lang="de-CH" dirty="0"/>
-              <a:t>Bug </a:t>
-            </a:r>
-            <a:r>
-              <a:rPr lang="de-CH" dirty="0" err="1"/>
-              <a:t>tracking</a:t>
-            </a:r>
-            <a:r>
-              <a:rPr lang="de-CH" dirty="0"/>
-              <a:t>: </a:t>
-            </a:r>
-            <a:r>
-              <a:rPr lang="de-CH" dirty="0" err="1"/>
-              <a:t>GitHub</a:t>
-            </a:r>
-            <a:r>
-              <a:rPr lang="de-CH" dirty="0"/>
-              <a:t> </a:t>
-            </a:r>
-            <a:r>
-              <a:rPr lang="de-CH" dirty="0" err="1"/>
-              <a:t>Issues</a:t>
-            </a:r>
-            <a:endParaRPr lang="de-CH" dirty="0"/>
-          </a:p>
-          <a:p>
-            <a:r>
-              <a:rPr lang="de-CH" dirty="0"/>
-              <a:t>Doc: </a:t>
-            </a:r>
-            <a:r>
-              <a:rPr lang="de-CH" dirty="0" err="1"/>
-              <a:t>GitHub</a:t>
-            </a:r>
-            <a:r>
-              <a:rPr lang="de-CH" dirty="0"/>
-              <a:t> Wiki</a:t>
-            </a:r>
-          </a:p>
-          <a:p>
-            <a:r>
-              <a:rPr lang="de-CH" dirty="0"/>
-              <a:t>Milestones / Tasks: </a:t>
-            </a:r>
-            <a:r>
-              <a:rPr lang="de-CH" dirty="0" err="1"/>
-              <a:t>Scrum</a:t>
-            </a:r>
-            <a:r>
-              <a:rPr lang="de-CH" dirty="0"/>
-              <a:t> </a:t>
-            </a:r>
-            <a:r>
-              <a:rPr lang="de-CH" dirty="0" err="1"/>
-              <a:t>excel</a:t>
-            </a:r>
-            <a:endParaRPr lang="de-CH" dirty="0"/>
-          </a:p>
-          <a:p>
-            <a:r>
-              <a:rPr lang="de-CH" dirty="0"/>
-              <a:t>Testing</a:t>
-            </a:r>
-          </a:p>
-          <a:p>
-            <a:pPr lvl="1"/>
-            <a:r>
-              <a:rPr lang="de-CH" sz="1600" dirty="0"/>
-              <a:t>Unit tests: RSpec</a:t>
-            </a:r>
-          </a:p>
-          <a:p>
-            <a:pPr lvl="1"/>
-            <a:r>
-              <a:rPr lang="de-CH" sz="1600" dirty="0"/>
-              <a:t>Acceptance tests: Selenium</a:t>
-            </a:r>
-          </a:p>
-        </p:txBody>
-      </p:sp>
-      <p:sp>
-        <p:nvSpPr>
-          <p:cNvPr id="4" name="Datumsplatzhalter 3"/>
-          <p:cNvSpPr>
-            <a:spLocks noGrp="1"/>
-          </p:cNvSpPr>
-          <p:nvPr>
-            <p:ph type="dt" idx="10"/>
-          </p:nvPr>
-        </p:nvSpPr>
-        <p:spPr/>
-        <p:txBody>
-          <a:bodyPr/>
-          <a:lstStyle/>
-          <a:p>
-            <a:pPr>
-              <a:defRPr/>
-            </a:pPr>
-            <a:r>
-              <a:rPr lang="de-DE" smtClean="0"/>
-              <a:t>06.10.2015</a:t>
-            </a:r>
-            <a:endParaRPr lang="de-DE"/>
-          </a:p>
-        </p:txBody>
-      </p:sp>
-    </p:spTree>
-    <p:extLst>
-      <p:ext uri="{BB962C8B-B14F-4D97-AF65-F5344CB8AC3E}">
-        <p14:creationId xmlns:p14="http://schemas.microsoft.com/office/powerpoint/2010/main" val="3536873116"/>
-      </p:ext>
-    </p:extLst>
-  </p:cSld>
-  <p:clrMapOvr>
-    <a:masterClrMapping/>
-  </p:clrMapOvr>
-  <p:timing>
-    <p:tnLst>
-      <p:par>
-        <p:cTn id="1" dur="indefinite" restart="never" nodeType="tmRoot"/>
-      </p:par>
-    </p:tnLst>
-  </p:timing>
-</p:sld>
-</file>
-
-<file path=ppt/slides/slide14.xml><?xml version="1.0" encoding="utf-8"?>
-<p:sld xmlns:a="http://schemas.openxmlformats.org/drawingml/2006/main" xmlns:r="http://schemas.openxmlformats.org/officeDocument/2006/relationships" xmlns:p="http://schemas.openxmlformats.org/presentationml/2006/main">
-  <p:cSld>
-    <p:spTree>
-      <p:nvGrpSpPr>
-        <p:cNvPr id="1" name=""/>
-        <p:cNvGrpSpPr/>
-        <p:nvPr/>
-      </p:nvGrpSpPr>
-      <p:grpSpPr>
-        <a:xfrm>
-          <a:off x="0" y="0"/>
-          <a:ext cx="0" cy="0"/>
-          <a:chOff x="0" y="0"/>
-          <a:chExt cx="0" cy="0"/>
-        </a:xfrm>
-      </p:grpSpPr>
-      <p:sp>
-        <p:nvSpPr>
-          <p:cNvPr id="2" name="Titel 1"/>
-          <p:cNvSpPr>
-            <a:spLocks noGrp="1"/>
-          </p:cNvSpPr>
-          <p:nvPr>
-            <p:ph type="title"/>
-          </p:nvPr>
-        </p:nvSpPr>
-        <p:spPr/>
-        <p:txBody>
-          <a:bodyPr/>
-          <a:lstStyle/>
-          <a:p>
-            <a:r>
               <a:rPr lang="de-CH" dirty="0" smtClean="0"/>
               <a:t>Project Plan II</a:t>
             </a:r>
@@ -12058,35 +11520,35 @@
                 <a:gridCol w="459594">
                   <a:extLst>
                     <a:ext uri="{9D8B030D-6E8A-4147-A177-3AD203B41FA5}">
-                      <a16:colId xmlns="" xmlns:a16="http://schemas.microsoft.com/office/drawing/2014/main" val="929042192"/>
+                      <a16:colId xmlns:a16="http://schemas.microsoft.com/office/drawing/2014/main" xmlns="" val="929042192"/>
                     </a:ext>
                   </a:extLst>
                 </a:gridCol>
                 <a:gridCol w="1080120">
                   <a:extLst>
                     <a:ext uri="{9D8B030D-6E8A-4147-A177-3AD203B41FA5}">
-                      <a16:colId xmlns="" xmlns:a16="http://schemas.microsoft.com/office/drawing/2014/main" val="1842701737"/>
+                      <a16:colId xmlns:a16="http://schemas.microsoft.com/office/drawing/2014/main" xmlns="" val="1842701737"/>
                     </a:ext>
                   </a:extLst>
                 </a:gridCol>
                 <a:gridCol w="1080120">
                   <a:extLst>
                     <a:ext uri="{9D8B030D-6E8A-4147-A177-3AD203B41FA5}">
-                      <a16:colId xmlns="" xmlns:a16="http://schemas.microsoft.com/office/drawing/2014/main" val="1174402447"/>
+                      <a16:colId xmlns:a16="http://schemas.microsoft.com/office/drawing/2014/main" xmlns="" val="1174402447"/>
                     </a:ext>
                   </a:extLst>
                 </a:gridCol>
                 <a:gridCol w="1944216">
                   <a:extLst>
                     <a:ext uri="{9D8B030D-6E8A-4147-A177-3AD203B41FA5}">
-                      <a16:colId xmlns="" xmlns:a16="http://schemas.microsoft.com/office/drawing/2014/main" val="3459286014"/>
+                      <a16:colId xmlns:a16="http://schemas.microsoft.com/office/drawing/2014/main" xmlns="" val="3459286014"/>
                     </a:ext>
                   </a:extLst>
                 </a:gridCol>
                 <a:gridCol w="4032448">
                   <a:extLst>
                     <a:ext uri="{9D8B030D-6E8A-4147-A177-3AD203B41FA5}">
-                      <a16:colId xmlns="" xmlns:a16="http://schemas.microsoft.com/office/drawing/2014/main" val="3583925632"/>
+                      <a16:colId xmlns:a16="http://schemas.microsoft.com/office/drawing/2014/main" xmlns="" val="3583925632"/>
                     </a:ext>
                   </a:extLst>
                 </a:gridCol>
@@ -12156,7 +11618,7 @@
                 </a:tc>
                 <a:extLst>
                   <a:ext uri="{0D108BD9-81ED-4DB2-BD59-A6C34878D82A}">
-                    <a16:rowId xmlns="" xmlns:a16="http://schemas.microsoft.com/office/drawing/2014/main" val="140496585"/>
+                    <a16:rowId xmlns:a16="http://schemas.microsoft.com/office/drawing/2014/main" xmlns="" val="140496585"/>
                   </a:ext>
                 </a:extLst>
               </a:tr>
@@ -12228,7 +11690,7 @@
                 </a:tc>
                 <a:extLst>
                   <a:ext uri="{0D108BD9-81ED-4DB2-BD59-A6C34878D82A}">
-                    <a16:rowId xmlns="" xmlns:a16="http://schemas.microsoft.com/office/drawing/2014/main" val="3902352979"/>
+                    <a16:rowId xmlns:a16="http://schemas.microsoft.com/office/drawing/2014/main" xmlns="" val="3902352979"/>
                   </a:ext>
                 </a:extLst>
               </a:tr>
@@ -12319,7 +11781,7 @@
                 </a:tc>
                 <a:extLst>
                   <a:ext uri="{0D108BD9-81ED-4DB2-BD59-A6C34878D82A}">
-                    <a16:rowId xmlns="" xmlns:a16="http://schemas.microsoft.com/office/drawing/2014/main" val="4160280596"/>
+                    <a16:rowId xmlns:a16="http://schemas.microsoft.com/office/drawing/2014/main" xmlns="" val="4160280596"/>
                   </a:ext>
                 </a:extLst>
               </a:tr>
@@ -12392,7 +11854,7 @@
                 </a:tc>
                 <a:extLst>
                   <a:ext uri="{0D108BD9-81ED-4DB2-BD59-A6C34878D82A}">
-                    <a16:rowId xmlns="" xmlns:a16="http://schemas.microsoft.com/office/drawing/2014/main" val="3339838036"/>
+                    <a16:rowId xmlns:a16="http://schemas.microsoft.com/office/drawing/2014/main" xmlns="" val="3339838036"/>
                   </a:ext>
                 </a:extLst>
               </a:tr>
@@ -12462,7 +11924,7 @@
                 </a:tc>
                 <a:extLst>
                   <a:ext uri="{0D108BD9-81ED-4DB2-BD59-A6C34878D82A}">
-                    <a16:rowId xmlns="" xmlns:a16="http://schemas.microsoft.com/office/drawing/2014/main" val="2487810453"/>
+                    <a16:rowId xmlns:a16="http://schemas.microsoft.com/office/drawing/2014/main" xmlns="" val="2487810453"/>
                   </a:ext>
                 </a:extLst>
               </a:tr>
@@ -12534,7 +11996,7 @@
                 </a:tc>
                 <a:extLst>
                   <a:ext uri="{0D108BD9-81ED-4DB2-BD59-A6C34878D82A}">
-                    <a16:rowId xmlns="" xmlns:a16="http://schemas.microsoft.com/office/drawing/2014/main" val="73290090"/>
+                    <a16:rowId xmlns:a16="http://schemas.microsoft.com/office/drawing/2014/main" xmlns="" val="73290090"/>
                   </a:ext>
                 </a:extLst>
               </a:tr>
@@ -12606,7 +12068,7 @@
                 </a:tc>
                 <a:extLst>
                   <a:ext uri="{0D108BD9-81ED-4DB2-BD59-A6C34878D82A}">
-                    <a16:rowId xmlns="" xmlns:a16="http://schemas.microsoft.com/office/drawing/2014/main" val="328603548"/>
+                    <a16:rowId xmlns:a16="http://schemas.microsoft.com/office/drawing/2014/main" xmlns="" val="328603548"/>
                   </a:ext>
                 </a:extLst>
               </a:tr>
@@ -12675,7 +12137,7 @@
                 </a:tc>
                 <a:extLst>
                   <a:ext uri="{0D108BD9-81ED-4DB2-BD59-A6C34878D82A}">
-                    <a16:rowId xmlns="" xmlns:a16="http://schemas.microsoft.com/office/drawing/2014/main" val="250985665"/>
+                    <a16:rowId xmlns:a16="http://schemas.microsoft.com/office/drawing/2014/main" xmlns="" val="250985665"/>
                   </a:ext>
                 </a:extLst>
               </a:tr>
@@ -13973,14 +13435,10 @@
           <a:lstStyle/>
           <a:p>
             <a:r>
-              <a:rPr lang="de-CH" dirty="0" smtClean="0"/>
-              <a:t>Project </a:t>
-            </a:r>
-            <a:r>
-              <a:rPr lang="de-CH" dirty="0" err="1" smtClean="0"/>
-              <a:t>Idea</a:t>
-            </a:r>
-            <a:endParaRPr lang="de-CH" dirty="0"/>
+              <a:rPr lang="de-CH" dirty="0"/>
+              <a:t>Services</a:t>
+            </a:r>
+            <a:endParaRPr lang="de-DE" dirty="0"/>
           </a:p>
         </p:txBody>
       </p:sp>
@@ -14001,78 +13459,66 @@
           <a:p>
             <a:r>
               <a:rPr lang="de-CH" dirty="0"/>
-              <a:t>Compare trainings</a:t>
-            </a:r>
-            <a:endParaRPr lang="de-DE" dirty="0"/>
-          </a:p>
-          <a:p>
-            <a:pPr lvl="1"/>
-            <a:r>
-              <a:rPr lang="de-CH" sz="1600" dirty="0" err="1"/>
-              <a:t>Length</a:t>
-            </a:r>
-            <a:endParaRPr lang="de-CH" sz="1600" dirty="0"/>
-          </a:p>
-          <a:p>
-            <a:pPr lvl="1"/>
-            <a:r>
-              <a:rPr lang="de-CH" sz="1600" dirty="0" err="1"/>
-              <a:t>Most attendent training</a:t>
-            </a:r>
-            <a:endParaRPr lang="de-CH" sz="1600" dirty="0"/>
-          </a:p>
-          <a:p>
+              <a:t>Facebook (</a:t>
+            </a:r>
             <a:r>
               <a:rPr lang="de-CH" dirty="0">
                 <a:latin typeface="Arial" charset="0"/>
               </a:rPr>
-              <a:t>Communation services</a:t>
-            </a:r>
-            <a:r>
-              <a:rPr lang="de-CH" sz="3600" dirty="0">
+              <a:t>https://developers.facebook.com/)</a:t>
+            </a:r>
+            <a:endParaRPr lang="de-DE" dirty="0">
+              <a:latin typeface="Arial" charset="0"/>
+            </a:endParaRPr>
+          </a:p>
+          <a:p>
+            <a:r>
+              <a:rPr lang="de-CH" dirty="0"/>
+              <a:t>Twitter (</a:t>
+            </a:r>
+            <a:r>
+              <a:rPr lang="de-CH" dirty="0">
                 <a:latin typeface="Arial" charset="0"/>
               </a:rPr>
-              <a:t> </a:t>
-            </a:r>
-          </a:p>
-          <a:p>
-            <a:pPr lvl="1"/>
-            <a:r>
-              <a:rPr lang="de-CH" sz="1600" dirty="0">
+              <a:t>https://dev.twitter.com/)</a:t>
+            </a:r>
+          </a:p>
+          <a:p>
+            <a:r>
+              <a:rPr lang="de-CH" dirty="0"/>
+              <a:t>Google </a:t>
+            </a:r>
+            <a:r>
+              <a:rPr lang="de-CH" dirty="0" err="1"/>
+              <a:t>Maps (</a:t>
+            </a:r>
+            <a:r>
+              <a:rPr lang="de-CH" dirty="0">
                 <a:latin typeface="Arial" charset="0"/>
               </a:rPr>
-              <a:t>Send message to others</a:t>
-            </a:r>
-          </a:p>
-          <a:p>
-            <a:pPr lvl="1"/>
-            <a:r>
-              <a:rPr lang="de-CH" sz="1600" dirty="0">
+              <a:t>https://developers.google.com/maps/documentation/javascript/)</a:t>
+            </a:r>
+          </a:p>
+          <a:p>
+            <a:r>
+              <a:rPr lang="de-CH" dirty="0" err="1"/>
+              <a:t>Weather (https://openweathermap.org/api)</a:t>
+            </a:r>
+            <a:endParaRPr lang="de-CH" dirty="0"/>
+          </a:p>
+          <a:p>
+            <a:r>
+              <a:rPr lang="de-CH" dirty="0"/>
+              <a:t>SBB (http://transport.opendata.ch)</a:t>
+            </a:r>
+          </a:p>
+          <a:p>
+            <a:r>
+              <a:rPr lang="de-CH" dirty="0">
                 <a:latin typeface="Arial" charset="0"/>
               </a:rPr>
-              <a:t>Invite others to training (Email, Twitter, Facebook, InApp)</a:t>
-            </a:r>
-          </a:p>
-          <a:p>
-            <a:pPr lvl="1"/>
-            <a:r>
-              <a:rPr lang="en-US" sz="1600" dirty="0">
-                <a:latin typeface="Arial" charset="0"/>
-              </a:rPr>
-              <a:t>Notification about new trainings from your friends (Email, InApp)</a:t>
-            </a:r>
-          </a:p>
-          <a:p>
-            <a:pPr lvl="1"/>
-            <a:r>
-              <a:rPr lang="en-US" sz="1600" dirty="0">
-                <a:latin typeface="Arial" charset="0"/>
-              </a:rPr>
-              <a:t>Notification for planned trainings and ical feed</a:t>
-            </a:r>
-            <a:endParaRPr lang="de-CH" sz="1600" dirty="0">
-              <a:latin typeface="Arial" charset="0"/>
-            </a:endParaRPr>
+              <a:t>Gmail Account</a:t>
+            </a:r>
           </a:p>
         </p:txBody>
       </p:sp>
@@ -14105,7 +13551,7 @@
     </p:spTree>
     <p:extLst>
       <p:ext uri="{BB962C8B-B14F-4D97-AF65-F5344CB8AC3E}">
-        <p14:creationId xmlns:p14="http://schemas.microsoft.com/office/powerpoint/2010/main" val="2511054549"/>
+        <p14:creationId xmlns:p14="http://schemas.microsoft.com/office/powerpoint/2010/main" val="3242594773"/>
       </p:ext>
     </p:extLst>
   </p:cSld>

</xml_diff>